<commit_message>
Algorytmy sortowania szybkiego i przez scalanie
</commit_message>
<xml_diff>
--- a/Algorytmy/DFS – przebieg algorytmu.pptx
+++ b/Algorytmy/DFS – przebieg algorytmu.pptx
@@ -123,13 +123,18 @@
       </a:defRPr>
     </a:lvl9pPr>
   </p:defaultTextStyle>
+  <p:extLst>
+    <p:ext uri="{EFAFB233-063F-42B5-8137-9DF3F51BA10A}">
+      <p15:sldGuideLst xmlns:p15="http://schemas.microsoft.com/office/powerpoint/2012/main"/>
+    </p:ext>
+  </p:extLst>
 </p:presentation>
 </file>
 
 <file path=ppt/revisionInfo.xml><?xml version="1.0" encoding="utf-8"?>
 <p1510:revInfo xmlns:a="http://schemas.openxmlformats.org/drawingml/2006/main" xmlns:r="http://schemas.openxmlformats.org/officeDocument/2006/relationships" xmlns:p1510="http://schemas.microsoft.com/office/powerpoint/2015/10/main">
   <p1510:revLst>
-    <p1510:client id="{F45FD297-9C80-4C9B-8DC6-7DDF8BC24FDE}" v="18" dt="2021-05-17T07:12:17.703"/>
+    <p1510:client id="{2199924C-96E2-4934-A8C7-7409093C3A93}" v="3" dt="2022-04-13T14:01:28.890"/>
   </p1510:revLst>
 </p1510:revInfo>
 </file>
@@ -513,6 +518,38 @@
       </pc:sldChg>
     </pc:docChg>
   </pc:docChgLst>
+  <pc:docChgLst>
+    <pc:chgData name="Damian Kurpiewski" userId="a6c40eeacb61fb23" providerId="LiveId" clId="{2199924C-96E2-4934-A8C7-7409093C3A93}"/>
+    <pc:docChg chg="modSld">
+      <pc:chgData name="Damian Kurpiewski" userId="a6c40eeacb61fb23" providerId="LiveId" clId="{2199924C-96E2-4934-A8C7-7409093C3A93}" dt="2022-04-13T14:01:28.889" v="2" actId="1582"/>
+      <pc:docMkLst>
+        <pc:docMk/>
+      </pc:docMkLst>
+      <pc:sldChg chg="modSp">
+        <pc:chgData name="Damian Kurpiewski" userId="a6c40eeacb61fb23" providerId="LiveId" clId="{2199924C-96E2-4934-A8C7-7409093C3A93}" dt="2022-04-13T14:01:28.889" v="2" actId="1582"/>
+        <pc:sldMkLst>
+          <pc:docMk/>
+          <pc:sldMk cId="41962419" sldId="256"/>
+        </pc:sldMkLst>
+        <pc:spChg chg="mod">
+          <ac:chgData name="Damian Kurpiewski" userId="a6c40eeacb61fb23" providerId="LiveId" clId="{2199924C-96E2-4934-A8C7-7409093C3A93}" dt="2022-04-13T14:01:15.453" v="0" actId="208"/>
+          <ac:spMkLst>
+            <pc:docMk/>
+            <pc:sldMk cId="41962419" sldId="256"/>
+            <ac:spMk id="2" creationId="{43696140-EEE5-45B4-A740-968CFECDDAA2}"/>
+          </ac:spMkLst>
+        </pc:spChg>
+        <pc:spChg chg="mod">
+          <ac:chgData name="Damian Kurpiewski" userId="a6c40eeacb61fb23" providerId="LiveId" clId="{2199924C-96E2-4934-A8C7-7409093C3A93}" dt="2022-04-13T14:01:28.889" v="2" actId="1582"/>
+          <ac:spMkLst>
+            <pc:docMk/>
+            <pc:sldMk cId="41962419" sldId="256"/>
+            <ac:spMk id="3" creationId="{8366F8C4-E35F-43EA-B76A-A65860AF007C}"/>
+          </ac:spMkLst>
+        </pc:spChg>
+      </pc:sldChg>
+    </pc:docChg>
+  </pc:docChgLst>
 </pc:chgInfo>
 </file>
 
@@ -663,7 +700,7 @@
           <a:p>
             <a:fld id="{B65BDE10-A607-4B8D-B4EA-EB53DC1AA284}" type="datetimeFigureOut">
               <a:rPr lang="pl-PL" smtClean="0"/>
-              <a:t>17.05.2021</a:t>
+              <a:t>13.04.2022</a:t>
             </a:fld>
             <a:endParaRPr lang="pl-PL"/>
           </a:p>
@@ -861,7 +898,7 @@
           <a:p>
             <a:fld id="{B65BDE10-A607-4B8D-B4EA-EB53DC1AA284}" type="datetimeFigureOut">
               <a:rPr lang="pl-PL" smtClean="0"/>
-              <a:t>17.05.2021</a:t>
+              <a:t>13.04.2022</a:t>
             </a:fld>
             <a:endParaRPr lang="pl-PL"/>
           </a:p>
@@ -1069,7 +1106,7 @@
           <a:p>
             <a:fld id="{B65BDE10-A607-4B8D-B4EA-EB53DC1AA284}" type="datetimeFigureOut">
               <a:rPr lang="pl-PL" smtClean="0"/>
-              <a:t>17.05.2021</a:t>
+              <a:t>13.04.2022</a:t>
             </a:fld>
             <a:endParaRPr lang="pl-PL"/>
           </a:p>
@@ -1267,7 +1304,7 @@
           <a:p>
             <a:fld id="{B65BDE10-A607-4B8D-B4EA-EB53DC1AA284}" type="datetimeFigureOut">
               <a:rPr lang="pl-PL" smtClean="0"/>
-              <a:t>17.05.2021</a:t>
+              <a:t>13.04.2022</a:t>
             </a:fld>
             <a:endParaRPr lang="pl-PL"/>
           </a:p>
@@ -1542,7 +1579,7 @@
           <a:p>
             <a:fld id="{B65BDE10-A607-4B8D-B4EA-EB53DC1AA284}" type="datetimeFigureOut">
               <a:rPr lang="pl-PL" smtClean="0"/>
-              <a:t>17.05.2021</a:t>
+              <a:t>13.04.2022</a:t>
             </a:fld>
             <a:endParaRPr lang="pl-PL"/>
           </a:p>
@@ -1807,7 +1844,7 @@
           <a:p>
             <a:fld id="{B65BDE10-A607-4B8D-B4EA-EB53DC1AA284}" type="datetimeFigureOut">
               <a:rPr lang="pl-PL" smtClean="0"/>
-              <a:t>17.05.2021</a:t>
+              <a:t>13.04.2022</a:t>
             </a:fld>
             <a:endParaRPr lang="pl-PL"/>
           </a:p>
@@ -2219,7 +2256,7 @@
           <a:p>
             <a:fld id="{B65BDE10-A607-4B8D-B4EA-EB53DC1AA284}" type="datetimeFigureOut">
               <a:rPr lang="pl-PL" smtClean="0"/>
-              <a:t>17.05.2021</a:t>
+              <a:t>13.04.2022</a:t>
             </a:fld>
             <a:endParaRPr lang="pl-PL"/>
           </a:p>
@@ -2360,7 +2397,7 @@
           <a:p>
             <a:fld id="{B65BDE10-A607-4B8D-B4EA-EB53DC1AA284}" type="datetimeFigureOut">
               <a:rPr lang="pl-PL" smtClean="0"/>
-              <a:t>17.05.2021</a:t>
+              <a:t>13.04.2022</a:t>
             </a:fld>
             <a:endParaRPr lang="pl-PL"/>
           </a:p>
@@ -2473,7 +2510,7 @@
           <a:p>
             <a:fld id="{B65BDE10-A607-4B8D-B4EA-EB53DC1AA284}" type="datetimeFigureOut">
               <a:rPr lang="pl-PL" smtClean="0"/>
-              <a:t>17.05.2021</a:t>
+              <a:t>13.04.2022</a:t>
             </a:fld>
             <a:endParaRPr lang="pl-PL"/>
           </a:p>
@@ -2784,7 +2821,7 @@
           <a:p>
             <a:fld id="{B65BDE10-A607-4B8D-B4EA-EB53DC1AA284}" type="datetimeFigureOut">
               <a:rPr lang="pl-PL" smtClean="0"/>
-              <a:t>17.05.2021</a:t>
+              <a:t>13.04.2022</a:t>
             </a:fld>
             <a:endParaRPr lang="pl-PL"/>
           </a:p>
@@ -3072,7 +3109,7 @@
           <a:p>
             <a:fld id="{B65BDE10-A607-4B8D-B4EA-EB53DC1AA284}" type="datetimeFigureOut">
               <a:rPr lang="pl-PL" smtClean="0"/>
-              <a:t>17.05.2021</a:t>
+              <a:t>13.04.2022</a:t>
             </a:fld>
             <a:endParaRPr lang="pl-PL"/>
           </a:p>
@@ -3313,7 +3350,7 @@
           <a:p>
             <a:fld id="{B65BDE10-A607-4B8D-B4EA-EB53DC1AA284}" type="datetimeFigureOut">
               <a:rPr lang="pl-PL" smtClean="0"/>
-              <a:t>17.05.2021</a:t>
+              <a:t>13.04.2022</a:t>
             </a:fld>
             <a:endParaRPr lang="pl-PL"/>
           </a:p>
@@ -3864,7 +3901,7 @@
               <a:rPr lang="pl-PL" dirty="0">
                 <a:ln w="12700">
                   <a:solidFill>
-                    <a:schemeClr val="tx1"/>
+                    <a:schemeClr val="bg1"/>
                   </a:solidFill>
                 </a:ln>
                 <a:solidFill>
@@ -3906,9 +3943,9 @@
           <a:p>
             <a:r>
               <a:rPr lang="pl-PL" dirty="0">
-                <a:ln w="12700">
+                <a:ln w="6350">
                   <a:solidFill>
-                    <a:schemeClr val="tx1"/>
+                    <a:schemeClr val="bg1"/>
                   </a:solidFill>
                 </a:ln>
                 <a:solidFill>

</xml_diff>